<commit_message>
added graphs in presentation
</commit_message>
<xml_diff>
--- a/presentation/p_09.pptx
+++ b/presentation/p_09.pptx
@@ -5,7 +5,7 @@
     <p:sldMasterId id="2147483648" r:id="rId4"/>
   </p:sldMasterIdLst>
   <p:notesMasterIdLst>
-    <p:notesMasterId r:id="rId13"/>
+    <p:notesMasterId r:id="rId14"/>
   </p:notesMasterIdLst>
   <p:sldIdLst>
     <p:sldId id="256" r:id="rId5"/>
@@ -16,6 +16,7 @@
     <p:sldId id="261" r:id="rId10"/>
     <p:sldId id="263" r:id="rId11"/>
     <p:sldId id="264" r:id="rId12"/>
+    <p:sldId id="265" r:id="rId13"/>
   </p:sldIdLst>
   <p:sldSz cx="12192000" cy="6858000"/>
   <p:notesSz cx="6858000" cy="9144000"/>
@@ -122,10 +123,22 @@
 </p:presentation>
 </file>
 
+<file path=ppt/commentAuthors.xml><?xml version="1.0" encoding="utf-8"?>
+<p:cmAuthorLst xmlns:a="http://schemas.openxmlformats.org/drawingml/2006/main" xmlns:r="http://schemas.openxmlformats.org/officeDocument/2006/relationships" xmlns:p="http://schemas.openxmlformats.org/presentationml/2006/main">
+  <p:cmAuthor id="1" name="Srikrishna Sasidharan" initials="SS" lastIdx="1" clrIdx="0">
+    <p:extLst>
+      <p:ext uri="{19B8F6BF-5375-455C-9EA6-DF929625EA0E}">
+        <p15:presenceInfo xmlns:p15="http://schemas.microsoft.com/office/powerpoint/2012/main" userId="Srikrishna Sasidharan" providerId="None"/>
+      </p:ext>
+    </p:extLst>
+  </p:cmAuthor>
+</p:cmAuthorLst>
+</file>
+
 <file path=ppt/revisionInfo.xml><?xml version="1.0" encoding="utf-8"?>
 <p1510:revInfo xmlns:a="http://schemas.openxmlformats.org/drawingml/2006/main" xmlns:r="http://schemas.openxmlformats.org/officeDocument/2006/relationships" xmlns:p1510="http://schemas.microsoft.com/office/powerpoint/2015/10/main">
   <p1510:revLst>
-    <p1510:client id="{0572B425-A553-4660-A9D4-042B996EFD16}" v="341" dt="2020-04-06T02:12:26.061"/>
+    <p1510:client id="{0572B425-A553-4660-A9D4-042B996EFD16}" v="349" dt="2020-04-06T04:41:21.263"/>
     <p1510:client id="{2944625B-3A77-8BF5-D235-7D9D4B4152D6}" v="91" dt="2020-04-06T01:15:13.199"/>
     <p1510:client id="{6F5D439C-A93D-4B90-B3EC-E6FAB30F3BEE}" v="306" dt="2020-04-05T23:50:23.330"/>
     <p1510:client id="{C3530A72-A07C-4563-8B18-A203A3152915}" v="1126" dt="2020-04-06T02:19:12.734"/>
@@ -5686,18 +5699,10 @@
             </a:lnSpc>
           </a:pPr>
           <a:r>
-            <a:rPr lang="en-CA" dirty="0"/>
-            <a:t>Extracted the subtitles from </a:t>
+            <a:rPr lang="en-CA"/>
+            <a:t>Extracted the subtitles from youtube videos and also the summary of those videos.</a:t>
           </a:r>
-          <a:r>
-            <a:rPr lang="en-CA" dirty="0" err="1"/>
-            <a:t>youtube</a:t>
-          </a:r>
-          <a:r>
-            <a:rPr lang="en-CA" dirty="0"/>
-            <a:t> videos and also the summary of those videos.</a:t>
-          </a:r>
-          <a:endParaRPr lang="en-US" dirty="0"/>
+          <a:endParaRPr lang="en-US"/>
         </a:p>
       </dgm:t>
     </dgm:pt>
@@ -5736,14 +5741,14 @@
             </a:lnSpc>
           </a:pPr>
           <a:r>
-            <a:rPr lang="en-US" dirty="0"/>
+            <a:rPr lang="en-US"/>
             <a:t>No</a:t>
           </a:r>
           <a:r>
-            <a:rPr lang="en-US" baseline="0" dirty="0"/>
+            <a:rPr lang="en-US" baseline="0"/>
             <a:t> punctuations in the YouTube subtitles</a:t>
           </a:r>
-          <a:endParaRPr lang="en-US" dirty="0"/>
+          <a:endParaRPr lang="en-US"/>
         </a:p>
       </dgm:t>
     </dgm:pt>
@@ -5824,7 +5829,7 @@
             </a:lnSpc>
           </a:pPr>
           <a:r>
-            <a:rPr lang="en-US" dirty="0"/>
+            <a:rPr lang="en-US"/>
             <a:t>Extracted Short description/Summary did not meet the standard to be as “Golden Summary”</a:t>
           </a:r>
         </a:p>
@@ -5865,10 +5870,10 @@
             </a:lnSpc>
           </a:pPr>
           <a:r>
-            <a:rPr lang="en-CA" dirty="0"/>
+            <a:rPr lang="en-CA"/>
             <a:t>The summary in the videos was not enough and sometimes was a mere sentence.</a:t>
           </a:r>
-          <a:endParaRPr lang="en-US" dirty="0"/>
+          <a:endParaRPr lang="en-US"/>
         </a:p>
       </dgm:t>
     </dgm:pt>
@@ -6914,6 +6919,11 @@
         <a:bodyPr/>
         <a:lstStyle/>
         <a:p>
+          <a:pPr>
+            <a:lnSpc>
+              <a:spcPct val="100000"/>
+            </a:lnSpc>
+          </a:pPr>
           <a:r>
             <a:rPr lang="en-US"/>
             <a:t>TF-IDF, short for term frequency–inverse document frequency, is a numeric measure that is used to score the importance of a word in a document based on how often did it appear in that document and a given collection of documents.</a:t>
@@ -6950,6 +6960,11 @@
         <a:bodyPr/>
         <a:lstStyle/>
         <a:p>
+          <a:pPr>
+            <a:lnSpc>
+              <a:spcPct val="100000"/>
+            </a:lnSpc>
+          </a:pPr>
           <a:r>
             <a:rPr lang="en-CA" dirty="0"/>
             <a:t>Sentence will be sorted based on the TF-IDF</a:t>
@@ -6987,6 +7002,11 @@
         <a:bodyPr/>
         <a:lstStyle/>
         <a:p>
+          <a:pPr>
+            <a:lnSpc>
+              <a:spcPct val="100000"/>
+            </a:lnSpc>
+          </a:pPr>
           <a:r>
             <a:rPr lang="en-CA" dirty="0"/>
             <a:t>Based on the value of information that has to be retained, the summarization length is defined. Optimal value is for 80 percent.</a:t>
@@ -7024,6 +7044,11 @@
         <a:bodyPr/>
         <a:lstStyle/>
         <a:p>
+          <a:pPr>
+            <a:lnSpc>
+              <a:spcPct val="100000"/>
+            </a:lnSpc>
+          </a:pPr>
           <a:r>
             <a:rPr lang="en-US" dirty="0"/>
             <a:t>Sentences</a:t>
@@ -7387,15 +7412,15 @@
         <a:lstStyle/>
         <a:p>
           <a:r>
-            <a:rPr lang="en-CA"/>
+            <a:rPr lang="en-CA" dirty="0"/>
             <a:t>FastText(by Facebook)- “</a:t>
           </a:r>
           <a:r>
-            <a:rPr lang="en-CA" i="1"/>
+            <a:rPr lang="en-CA" i="1" dirty="0"/>
             <a:t>n-grams of each word is feed into NN to avoid situations when no matching word vectors”</a:t>
           </a:r>
           <a:r>
-            <a:rPr lang="en-CA"/>
+            <a:rPr lang="en-CA" dirty="0"/>
             <a:t>.</a:t>
           </a:r>
           <a:endParaRPr lang="en-US" dirty="0"/>
@@ -7472,10 +7497,9 @@
         <a:lstStyle/>
         <a:p>
           <a:r>
-            <a:rPr lang="en-US"/>
+            <a:rPr lang="en-US" dirty="0"/>
             <a:t>Cosine similarity is calculated based on SIF calculated for each sentence.</a:t>
           </a:r>
-          <a:endParaRPr lang="en-US" dirty="0"/>
         </a:p>
       </dgm:t>
     </dgm:pt>
@@ -8071,30 +8095,30 @@
     </dgm:pt>
   </dgm:ptLst>
   <dgm:cxnLst>
-    <dgm:cxn modelId="{16186D3E-F71B-49C5-887B-8B75FA13CBDC}" type="presOf" srcId="{EF65F918-4F40-4737-94B2-DD7FE48B7A66}" destId="{33587A7A-20B9-43A9-8743-3FDEF425E84C}" srcOrd="0" destOrd="0" presId="urn:microsoft.com/office/officeart/2018/2/layout/IconVerticalSolidList"/>
+    <dgm:cxn modelId="{ADEA632C-69E4-4B32-B164-A320739C7FF0}" type="presOf" srcId="{957ED093-279A-48FC-97E9-5714C586C2E6}" destId="{A4F3676E-DC8A-49AE-B610-DF54347CAC02}" srcOrd="0" destOrd="0" presId="urn:microsoft.com/office/officeart/2018/2/layout/IconVerticalSolidList"/>
+    <dgm:cxn modelId="{F0BBCB47-818C-47BA-BE84-F53CFF331D66}" type="presOf" srcId="{EF65F918-4F40-4737-94B2-DD7FE48B7A66}" destId="{33587A7A-20B9-43A9-8743-3FDEF425E84C}" srcOrd="0" destOrd="0" presId="urn:microsoft.com/office/officeart/2018/2/layout/IconVerticalSolidList"/>
+    <dgm:cxn modelId="{ADB80852-AE67-4A09-8FD7-6A5AB8F38BE7}" type="presOf" srcId="{A17DB128-9CEE-4BCC-9737-8B0FBB7E14C8}" destId="{FF28B4DF-F963-4911-AE85-930714C9DE69}" srcOrd="0" destOrd="0" presId="urn:microsoft.com/office/officeart/2018/2/layout/IconVerticalSolidList"/>
     <dgm:cxn modelId="{F16AD155-3E94-4D5A-8FC8-3D9D3761D84E}" srcId="{957ED093-279A-48FC-97E9-5714C586C2E6}" destId="{A17DB128-9CEE-4BCC-9737-8B0FBB7E14C8}" srcOrd="2" destOrd="0" parTransId="{958136CB-45BC-43C9-BB9C-2CC249D81324}" sibTransId="{EF18D6AB-201E-4828-80D7-C90F47FCE3A6}"/>
     <dgm:cxn modelId="{AF077682-7868-45AA-A604-96A55EE73D7F}" srcId="{957ED093-279A-48FC-97E9-5714C586C2E6}" destId="{22FFEE00-C7C8-443B-95A3-686B65D4A235}" srcOrd="1" destOrd="0" parTransId="{227F2EC1-626A-4276-B4B9-7DB214F44820}" sibTransId="{22C49C19-BC1D-401E-92B4-AB0427E2ED1E}"/>
-    <dgm:cxn modelId="{8735A88C-3935-4CCD-8EE5-618231407F97}" type="presOf" srcId="{A17DB128-9CEE-4BCC-9737-8B0FBB7E14C8}" destId="{FF28B4DF-F963-4911-AE85-930714C9DE69}" srcOrd="0" destOrd="0" presId="urn:microsoft.com/office/officeart/2018/2/layout/IconVerticalSolidList"/>
-    <dgm:cxn modelId="{1BCEBA97-1298-4607-9CD4-F44F99277E74}" type="presOf" srcId="{22FFEE00-C7C8-443B-95A3-686B65D4A235}" destId="{97C85446-272A-4778-AECB-9FA4A99D0CAC}" srcOrd="0" destOrd="0" presId="urn:microsoft.com/office/officeart/2018/2/layout/IconVerticalSolidList"/>
     <dgm:cxn modelId="{1425979C-5630-4ACD-A053-79DD5D6983E4}" srcId="{957ED093-279A-48FC-97E9-5714C586C2E6}" destId="{EF65F918-4F40-4737-94B2-DD7FE48B7A66}" srcOrd="0" destOrd="0" parTransId="{A303BE9D-1CAF-48F5-A761-CCD4D2B1D9C4}" sibTransId="{BC2460CA-B55C-4185-B8C2-E9A1EF1A2868}"/>
-    <dgm:cxn modelId="{BF08E39F-605F-4537-8B30-842D48F1A2D7}" type="presOf" srcId="{957ED093-279A-48FC-97E9-5714C586C2E6}" destId="{A4F3676E-DC8A-49AE-B610-DF54347CAC02}" srcOrd="0" destOrd="0" presId="urn:microsoft.com/office/officeart/2018/2/layout/IconVerticalSolidList"/>
-    <dgm:cxn modelId="{1C91324D-A8D8-41D2-B0FD-062C0A6DC237}" type="presParOf" srcId="{A4F3676E-DC8A-49AE-B610-DF54347CAC02}" destId="{E0AEF695-06BC-4BB6-A48F-30C72655BDC9}" srcOrd="0" destOrd="0" presId="urn:microsoft.com/office/officeart/2018/2/layout/IconVerticalSolidList"/>
-    <dgm:cxn modelId="{81DF79E5-1874-4992-8ADF-E895AE69EA86}" type="presParOf" srcId="{E0AEF695-06BC-4BB6-A48F-30C72655BDC9}" destId="{98866186-5104-4BA8-A2A8-C64E40F9EF6C}" srcOrd="0" destOrd="0" presId="urn:microsoft.com/office/officeart/2018/2/layout/IconVerticalSolidList"/>
-    <dgm:cxn modelId="{C3F54F83-4AAA-46CA-AA60-0418DA0C9BFD}" type="presParOf" srcId="{E0AEF695-06BC-4BB6-A48F-30C72655BDC9}" destId="{D73E3C3D-F0BC-42A8-9E07-7556B62B1593}" srcOrd="1" destOrd="0" presId="urn:microsoft.com/office/officeart/2018/2/layout/IconVerticalSolidList"/>
-    <dgm:cxn modelId="{1DB10488-54BE-4EBA-9483-6D64989A201D}" type="presParOf" srcId="{E0AEF695-06BC-4BB6-A48F-30C72655BDC9}" destId="{35FA0147-3C9B-4931-84F6-08AA9C10193D}" srcOrd="2" destOrd="0" presId="urn:microsoft.com/office/officeart/2018/2/layout/IconVerticalSolidList"/>
-    <dgm:cxn modelId="{31638E5D-0307-4DAE-9AC5-3C13F0F05294}" type="presParOf" srcId="{E0AEF695-06BC-4BB6-A48F-30C72655BDC9}" destId="{33587A7A-20B9-43A9-8743-3FDEF425E84C}" srcOrd="3" destOrd="0" presId="urn:microsoft.com/office/officeart/2018/2/layout/IconVerticalSolidList"/>
-    <dgm:cxn modelId="{66F4176D-9F06-418A-83CB-09A105B8C99F}" type="presParOf" srcId="{A4F3676E-DC8A-49AE-B610-DF54347CAC02}" destId="{1BECD0C8-40A1-4BC4-894C-E4BDE786A4A3}" srcOrd="1" destOrd="0" presId="urn:microsoft.com/office/officeart/2018/2/layout/IconVerticalSolidList"/>
-    <dgm:cxn modelId="{6B043EE7-2F98-4688-9860-1A737E4A22F3}" type="presParOf" srcId="{A4F3676E-DC8A-49AE-B610-DF54347CAC02}" destId="{620F9B16-038A-46D0-94A8-5057C03EDC9C}" srcOrd="2" destOrd="0" presId="urn:microsoft.com/office/officeart/2018/2/layout/IconVerticalSolidList"/>
-    <dgm:cxn modelId="{AF6B234E-9F89-4F8F-8382-035404E09FB4}" type="presParOf" srcId="{620F9B16-038A-46D0-94A8-5057C03EDC9C}" destId="{A1FD1768-74AF-48EF-B94B-8C3310F60751}" srcOrd="0" destOrd="0" presId="urn:microsoft.com/office/officeart/2018/2/layout/IconVerticalSolidList"/>
-    <dgm:cxn modelId="{D3105C26-2AAD-42C6-808E-7BCAD5AE880D}" type="presParOf" srcId="{620F9B16-038A-46D0-94A8-5057C03EDC9C}" destId="{FBDF1F2D-37FA-4C07-AFE0-75A4D2B76DF7}" srcOrd="1" destOrd="0" presId="urn:microsoft.com/office/officeart/2018/2/layout/IconVerticalSolidList"/>
-    <dgm:cxn modelId="{6BA2DDF2-4C78-4042-86F6-CC0608104263}" type="presParOf" srcId="{620F9B16-038A-46D0-94A8-5057C03EDC9C}" destId="{DD5C88CC-8279-4302-AE77-E0FA4B84AB22}" srcOrd="2" destOrd="0" presId="urn:microsoft.com/office/officeart/2018/2/layout/IconVerticalSolidList"/>
-    <dgm:cxn modelId="{6454802F-99F8-49D9-8DC6-838DC6A724C3}" type="presParOf" srcId="{620F9B16-038A-46D0-94A8-5057C03EDC9C}" destId="{97C85446-272A-4778-AECB-9FA4A99D0CAC}" srcOrd="3" destOrd="0" presId="urn:microsoft.com/office/officeart/2018/2/layout/IconVerticalSolidList"/>
-    <dgm:cxn modelId="{81D0EA9C-EA5B-4D84-9238-09EC96E0BA89}" type="presParOf" srcId="{A4F3676E-DC8A-49AE-B610-DF54347CAC02}" destId="{15AFC7CC-880F-45B1-891F-A0C0EA3554A7}" srcOrd="3" destOrd="0" presId="urn:microsoft.com/office/officeart/2018/2/layout/IconVerticalSolidList"/>
-    <dgm:cxn modelId="{B091D9D7-7BCD-4C68-961F-40F5A7266871}" type="presParOf" srcId="{A4F3676E-DC8A-49AE-B610-DF54347CAC02}" destId="{44252582-8A58-42D9-B6EB-7FD92D6FFDCE}" srcOrd="4" destOrd="0" presId="urn:microsoft.com/office/officeart/2018/2/layout/IconVerticalSolidList"/>
-    <dgm:cxn modelId="{5A9ED23A-BA2F-49D6-A112-4587D8DBE222}" type="presParOf" srcId="{44252582-8A58-42D9-B6EB-7FD92D6FFDCE}" destId="{CC7BC2E9-7A56-44C9-A576-95D9A920ED50}" srcOrd="0" destOrd="0" presId="urn:microsoft.com/office/officeart/2018/2/layout/IconVerticalSolidList"/>
-    <dgm:cxn modelId="{F81F1978-0E96-4E98-9A1D-3E771711BFBB}" type="presParOf" srcId="{44252582-8A58-42D9-B6EB-7FD92D6FFDCE}" destId="{8A0819FD-B0EA-4BB4-9978-F4C8BC4CB675}" srcOrd="1" destOrd="0" presId="urn:microsoft.com/office/officeart/2018/2/layout/IconVerticalSolidList"/>
-    <dgm:cxn modelId="{7C1DE7E2-6F12-42F1-A925-21B5F5232D48}" type="presParOf" srcId="{44252582-8A58-42D9-B6EB-7FD92D6FFDCE}" destId="{0D70A08F-B516-4B9F-A0C2-1369A047F0EA}" srcOrd="2" destOrd="0" presId="urn:microsoft.com/office/officeart/2018/2/layout/IconVerticalSolidList"/>
-    <dgm:cxn modelId="{46A86BE9-7B5D-4DF8-AF36-AF048D20300E}" type="presParOf" srcId="{44252582-8A58-42D9-B6EB-7FD92D6FFDCE}" destId="{FF28B4DF-F963-4911-AE85-930714C9DE69}" srcOrd="3" destOrd="0" presId="urn:microsoft.com/office/officeart/2018/2/layout/IconVerticalSolidList"/>
+    <dgm:cxn modelId="{AC09F5EB-8EDC-4DCE-9B80-313E63C11188}" type="presOf" srcId="{22FFEE00-C7C8-443B-95A3-686B65D4A235}" destId="{97C85446-272A-4778-AECB-9FA4A99D0CAC}" srcOrd="0" destOrd="0" presId="urn:microsoft.com/office/officeart/2018/2/layout/IconVerticalSolidList"/>
+    <dgm:cxn modelId="{8EEF9893-F053-49DE-8FBD-35E19EB0F571}" type="presParOf" srcId="{A4F3676E-DC8A-49AE-B610-DF54347CAC02}" destId="{E0AEF695-06BC-4BB6-A48F-30C72655BDC9}" srcOrd="0" destOrd="0" presId="urn:microsoft.com/office/officeart/2018/2/layout/IconVerticalSolidList"/>
+    <dgm:cxn modelId="{DC4F0547-5552-4585-9C65-08C123D087B3}" type="presParOf" srcId="{E0AEF695-06BC-4BB6-A48F-30C72655BDC9}" destId="{98866186-5104-4BA8-A2A8-C64E40F9EF6C}" srcOrd="0" destOrd="0" presId="urn:microsoft.com/office/officeart/2018/2/layout/IconVerticalSolidList"/>
+    <dgm:cxn modelId="{C7145ADF-D9A7-4695-8FE7-9555124E6DA1}" type="presParOf" srcId="{E0AEF695-06BC-4BB6-A48F-30C72655BDC9}" destId="{D73E3C3D-F0BC-42A8-9E07-7556B62B1593}" srcOrd="1" destOrd="0" presId="urn:microsoft.com/office/officeart/2018/2/layout/IconVerticalSolidList"/>
+    <dgm:cxn modelId="{29484431-33D9-4532-B9F2-A9859229B5E6}" type="presParOf" srcId="{E0AEF695-06BC-4BB6-A48F-30C72655BDC9}" destId="{35FA0147-3C9B-4931-84F6-08AA9C10193D}" srcOrd="2" destOrd="0" presId="urn:microsoft.com/office/officeart/2018/2/layout/IconVerticalSolidList"/>
+    <dgm:cxn modelId="{66FF2020-25CE-4090-B537-46AFD65BE6AD}" type="presParOf" srcId="{E0AEF695-06BC-4BB6-A48F-30C72655BDC9}" destId="{33587A7A-20B9-43A9-8743-3FDEF425E84C}" srcOrd="3" destOrd="0" presId="urn:microsoft.com/office/officeart/2018/2/layout/IconVerticalSolidList"/>
+    <dgm:cxn modelId="{34255745-5840-4803-A854-A034FDB95381}" type="presParOf" srcId="{A4F3676E-DC8A-49AE-B610-DF54347CAC02}" destId="{1BECD0C8-40A1-4BC4-894C-E4BDE786A4A3}" srcOrd="1" destOrd="0" presId="urn:microsoft.com/office/officeart/2018/2/layout/IconVerticalSolidList"/>
+    <dgm:cxn modelId="{D37B1953-C4F6-4895-A3C1-0979D0211279}" type="presParOf" srcId="{A4F3676E-DC8A-49AE-B610-DF54347CAC02}" destId="{620F9B16-038A-46D0-94A8-5057C03EDC9C}" srcOrd="2" destOrd="0" presId="urn:microsoft.com/office/officeart/2018/2/layout/IconVerticalSolidList"/>
+    <dgm:cxn modelId="{2C676FFC-9AA9-4670-8F24-4F2C361C6726}" type="presParOf" srcId="{620F9B16-038A-46D0-94A8-5057C03EDC9C}" destId="{A1FD1768-74AF-48EF-B94B-8C3310F60751}" srcOrd="0" destOrd="0" presId="urn:microsoft.com/office/officeart/2018/2/layout/IconVerticalSolidList"/>
+    <dgm:cxn modelId="{2DB46B95-DD61-4123-B7E6-ABD613DD158D}" type="presParOf" srcId="{620F9B16-038A-46D0-94A8-5057C03EDC9C}" destId="{FBDF1F2D-37FA-4C07-AFE0-75A4D2B76DF7}" srcOrd="1" destOrd="0" presId="urn:microsoft.com/office/officeart/2018/2/layout/IconVerticalSolidList"/>
+    <dgm:cxn modelId="{F09D2D87-CD0E-4D35-B027-5DDD3BB92391}" type="presParOf" srcId="{620F9B16-038A-46D0-94A8-5057C03EDC9C}" destId="{DD5C88CC-8279-4302-AE77-E0FA4B84AB22}" srcOrd="2" destOrd="0" presId="urn:microsoft.com/office/officeart/2018/2/layout/IconVerticalSolidList"/>
+    <dgm:cxn modelId="{ABABB656-78C7-4499-ACAF-C06004B599B3}" type="presParOf" srcId="{620F9B16-038A-46D0-94A8-5057C03EDC9C}" destId="{97C85446-272A-4778-AECB-9FA4A99D0CAC}" srcOrd="3" destOrd="0" presId="urn:microsoft.com/office/officeart/2018/2/layout/IconVerticalSolidList"/>
+    <dgm:cxn modelId="{D8B4E19A-3956-4A04-830C-997F8AE69F71}" type="presParOf" srcId="{A4F3676E-DC8A-49AE-B610-DF54347CAC02}" destId="{15AFC7CC-880F-45B1-891F-A0C0EA3554A7}" srcOrd="3" destOrd="0" presId="urn:microsoft.com/office/officeart/2018/2/layout/IconVerticalSolidList"/>
+    <dgm:cxn modelId="{13A3063C-399F-4473-B02E-450E87157984}" type="presParOf" srcId="{A4F3676E-DC8A-49AE-B610-DF54347CAC02}" destId="{44252582-8A58-42D9-B6EB-7FD92D6FFDCE}" srcOrd="4" destOrd="0" presId="urn:microsoft.com/office/officeart/2018/2/layout/IconVerticalSolidList"/>
+    <dgm:cxn modelId="{EF14BDE4-9A2A-4C7B-B6F6-E579A67DDC47}" type="presParOf" srcId="{44252582-8A58-42D9-B6EB-7FD92D6FFDCE}" destId="{CC7BC2E9-7A56-44C9-A576-95D9A920ED50}" srcOrd="0" destOrd="0" presId="urn:microsoft.com/office/officeart/2018/2/layout/IconVerticalSolidList"/>
+    <dgm:cxn modelId="{3E4C974C-6C90-472F-A9F9-342BC39C1856}" type="presParOf" srcId="{44252582-8A58-42D9-B6EB-7FD92D6FFDCE}" destId="{8A0819FD-B0EA-4BB4-9978-F4C8BC4CB675}" srcOrd="1" destOrd="0" presId="urn:microsoft.com/office/officeart/2018/2/layout/IconVerticalSolidList"/>
+    <dgm:cxn modelId="{A429F9BF-2F3B-478D-AD84-54444794C8ED}" type="presParOf" srcId="{44252582-8A58-42D9-B6EB-7FD92D6FFDCE}" destId="{0D70A08F-B516-4B9F-A0C2-1369A047F0EA}" srcOrd="2" destOrd="0" presId="urn:microsoft.com/office/officeart/2018/2/layout/IconVerticalSolidList"/>
+    <dgm:cxn modelId="{12158FE4-7A93-4175-9FFE-8D0BE4C036F7}" type="presParOf" srcId="{44252582-8A58-42D9-B6EB-7FD92D6FFDCE}" destId="{FF28B4DF-F963-4911-AE85-930714C9DE69}" srcOrd="3" destOrd="0" presId="urn:microsoft.com/office/officeart/2018/2/layout/IconVerticalSolidList"/>
   </dgm:cxnLst>
   <dgm:bg/>
   <dgm:whole/>
@@ -8255,18 +8279,10 @@
             <a:buNone/>
           </a:pPr>
           <a:r>
-            <a:rPr lang="en-CA" sz="1900" kern="1200" dirty="0"/>
-            <a:t>Extracted the subtitles from </a:t>
+            <a:rPr lang="en-CA" sz="1900" kern="1200"/>
+            <a:t>Extracted the subtitles from youtube videos and also the summary of those videos.</a:t>
           </a:r>
-          <a:r>
-            <a:rPr lang="en-CA" sz="1900" kern="1200" dirty="0" err="1"/>
-            <a:t>youtube</a:t>
-          </a:r>
-          <a:r>
-            <a:rPr lang="en-CA" sz="1900" kern="1200" dirty="0"/>
-            <a:t> videos and also the summary of those videos.</a:t>
-          </a:r>
-          <a:endParaRPr lang="en-US" sz="1900" kern="1200" dirty="0"/>
+          <a:endParaRPr lang="en-US" sz="1900" kern="1200"/>
         </a:p>
       </dsp:txBody>
       <dsp:txXfrm>
@@ -8415,14 +8431,14 @@
             <a:buNone/>
           </a:pPr>
           <a:r>
-            <a:rPr lang="en-US" sz="1900" kern="1200" dirty="0"/>
+            <a:rPr lang="en-US" sz="1900" kern="1200"/>
             <a:t>No</a:t>
           </a:r>
           <a:r>
-            <a:rPr lang="en-US" sz="1900" kern="1200" baseline="0" dirty="0"/>
+            <a:rPr lang="en-US" sz="1900" kern="1200" baseline="0"/>
             <a:t> punctuations in the YouTube subtitles</a:t>
           </a:r>
-          <a:endParaRPr lang="en-US" sz="1900" kern="1200" dirty="0"/>
+          <a:endParaRPr lang="en-US" sz="1900" kern="1200"/>
         </a:p>
       </dsp:txBody>
       <dsp:txXfrm>
@@ -8723,7 +8739,7 @@
             <a:buNone/>
           </a:pPr>
           <a:r>
-            <a:rPr lang="en-US" sz="1900" kern="1200" dirty="0"/>
+            <a:rPr lang="en-US" sz="1900" kern="1200"/>
             <a:t>Extracted Short description/Summary did not meet the standard to be as “Golden Summary”</a:t>
           </a:r>
         </a:p>
@@ -8874,10 +8890,10 @@
             <a:buNone/>
           </a:pPr>
           <a:r>
-            <a:rPr lang="en-CA" sz="1900" kern="1200" dirty="0"/>
+            <a:rPr lang="en-CA" sz="1900" kern="1200"/>
             <a:t>The summary in the videos was not enough and sometimes was a mere sentence.</a:t>
           </a:r>
-          <a:endParaRPr lang="en-US" sz="1900" kern="1200" dirty="0"/>
+          <a:endParaRPr lang="en-US" sz="1900" kern="1200"/>
         </a:p>
       </dsp:txBody>
       <dsp:txXfrm>
@@ -9971,7 +9987,7 @@
         <a:p>
           <a:pPr marL="0" lvl="0" indent="0" algn="l" defTabSz="666750">
             <a:lnSpc>
-              <a:spcPct val="90000"/>
+              <a:spcPct val="100000"/>
             </a:lnSpc>
             <a:spcBef>
               <a:spcPct val="0"/>
@@ -10122,7 +10138,7 @@
         <a:p>
           <a:pPr marL="0" lvl="0" indent="0" algn="l" defTabSz="666750">
             <a:lnSpc>
-              <a:spcPct val="90000"/>
+              <a:spcPct val="100000"/>
             </a:lnSpc>
             <a:spcBef>
               <a:spcPct val="0"/>
@@ -10274,7 +10290,7 @@
         <a:p>
           <a:pPr marL="0" lvl="0" indent="0" algn="l" defTabSz="666750">
             <a:lnSpc>
-              <a:spcPct val="90000"/>
+              <a:spcPct val="100000"/>
             </a:lnSpc>
             <a:spcBef>
               <a:spcPct val="0"/>
@@ -10426,7 +10442,7 @@
         <a:p>
           <a:pPr marL="0" lvl="0" indent="0" algn="l" defTabSz="666750">
             <a:lnSpc>
-              <a:spcPct val="90000"/>
+              <a:spcPct val="100000"/>
             </a:lnSpc>
             <a:spcBef>
               <a:spcPct val="0"/>
@@ -10766,15 +10782,15 @@
             <a:buNone/>
           </a:pPr>
           <a:r>
-            <a:rPr lang="en-CA" sz="2200" kern="1200"/>
+            <a:rPr lang="en-CA" sz="2200" kern="1200" dirty="0"/>
             <a:t>FastText(by Facebook)- “</a:t>
           </a:r>
           <a:r>
-            <a:rPr lang="en-CA" sz="2200" i="1" kern="1200"/>
+            <a:rPr lang="en-CA" sz="2200" i="1" kern="1200" dirty="0"/>
             <a:t>n-grams of each word is feed into NN to avoid situations when no matching word vectors”</a:t>
           </a:r>
           <a:r>
-            <a:rPr lang="en-CA" sz="2200" kern="1200"/>
+            <a:rPr lang="en-CA" sz="2200" kern="1200" dirty="0"/>
             <a:t>.</a:t>
           </a:r>
           <a:endParaRPr lang="en-US" sz="2200" kern="1200" dirty="0"/>
@@ -11082,10 +11098,9 @@
             <a:buNone/>
           </a:pPr>
           <a:r>
-            <a:rPr lang="en-US" sz="2200" kern="1200"/>
+            <a:rPr lang="en-US" sz="2200" kern="1200" dirty="0"/>
             <a:t>Cosine similarity is calculated based on SIF calculated for each sentence.</a:t>
           </a:r>
-          <a:endParaRPr lang="en-US" sz="2200" kern="1200" dirty="0"/>
         </a:p>
       </dsp:txBody>
       <dsp:txXfrm>
@@ -20040,19 +20055,19 @@
           <a:lstStyle/>
           <a:p>
             <a:r>
-              <a:rPr lang="en-CA"/>
+              <a:rPr lang="en-CA" dirty="0"/>
               <a:t>Glove-(unlike Word2Vec, Glove doesn’t rely just on local context information i.e. semantics of a word is affected by only surrounding words in Word2Vec whereas Glove uses both local and global statistics to compute vectors for given word)</a:t>
             </a:r>
           </a:p>
           <a:p>
-            <a:endParaRPr lang="en-CA"/>
+            <a:endParaRPr lang="en-CA" dirty="0"/>
           </a:p>
           <a:p>
-            <a:endParaRPr lang="en-CA"/>
+            <a:endParaRPr lang="en-CA" dirty="0"/>
           </a:p>
           <a:p>
             <a:r>
-              <a:rPr lang="en-CA"/>
+              <a:rPr lang="en-CA" dirty="0"/>
               <a:t>FastText feeds n-grams(ignoring starting and ending boundaries of a word). (Note: This helps identifying even rare words since it uses only n-gram vectors. Works even for unknown words.)</a:t>
             </a:r>
           </a:p>
@@ -20083,13 +20098,13 @@
             <a:endParaRPr lang="en-CA" dirty="0"/>
           </a:p>
           <a:p>
-            <a:endParaRPr lang="en-CA"/>
+            <a:endParaRPr lang="en-CA" dirty="0"/>
           </a:p>
           <a:p>
-            <a:endParaRPr lang="en-CA"/>
+            <a:endParaRPr lang="en-CA" dirty="0"/>
           </a:p>
           <a:p>
-            <a:endParaRPr lang="en-CA"/>
+            <a:endParaRPr lang="en-CA" dirty="0"/>
           </a:p>
         </p:txBody>
       </p:sp>
@@ -23505,11 +23520,11 @@
               <a:buChar char="•"/>
             </a:pPr>
             <a:r>
-              <a:rPr lang="en-US" sz="1500" dirty="0" err="1"/>
+              <a:rPr lang="en-US" sz="1500" err="1"/>
               <a:t>Karthikk</a:t>
             </a:r>
             <a:r>
-              <a:rPr lang="en-US" sz="1500" dirty="0"/>
+              <a:rPr lang="en-US" sz="1500"/>
               <a:t> T.</a:t>
             </a:r>
           </a:p>
@@ -23519,11 +23534,11 @@
               <a:buChar char="•"/>
             </a:pPr>
             <a:r>
-              <a:rPr lang="en-US" sz="1500" dirty="0" err="1"/>
+              <a:rPr lang="en-US" sz="1500" err="1"/>
               <a:t>Thanigaiselvan</a:t>
             </a:r>
             <a:r>
-              <a:rPr lang="en-US" sz="1500" dirty="0"/>
+              <a:rPr lang="en-US" sz="1500"/>
               <a:t> S.</a:t>
             </a:r>
           </a:p>
@@ -23533,11 +23548,11 @@
               <a:buChar char="•"/>
             </a:pPr>
             <a:r>
-              <a:rPr lang="en-US" sz="1500" dirty="0" err="1"/>
+              <a:rPr lang="en-US" sz="1500" err="1"/>
               <a:t>Muthukumar</a:t>
             </a:r>
             <a:r>
-              <a:rPr lang="en-US" sz="1500" dirty="0"/>
+              <a:rPr lang="en-US" sz="1500"/>
               <a:t> R.</a:t>
             </a:r>
           </a:p>
@@ -23547,7 +23562,7 @@
               <a:buChar char="•"/>
             </a:pPr>
             <a:r>
-              <a:rPr lang="en-US" sz="1500" dirty="0"/>
+              <a:rPr lang="en-US" sz="1500"/>
               <a:t>Srikrishna S.</a:t>
             </a:r>
           </a:p>
@@ -23732,7 +23747,7 @@
           <a:lstStyle/>
           <a:p>
             <a:pPr algn="ctr"/>
-            <a:endParaRPr lang="en-US" dirty="0"/>
+            <a:endParaRPr lang="en-US"/>
           </a:p>
         </p:txBody>
       </p:sp>
@@ -23962,7 +23977,7 @@
           <a:bodyPr rtlCol="0" anchor="ctr"/>
           <a:lstStyle/>
           <a:p>
-            <a:endParaRPr lang="en-US" dirty="0"/>
+            <a:endParaRPr lang="en-US"/>
           </a:p>
         </p:txBody>
       </p:sp>
@@ -24227,7 +24242,7 @@
           <a:lstStyle/>
           <a:p>
             <a:pPr algn="ctr"/>
-            <a:endParaRPr lang="en-US" dirty="0"/>
+            <a:endParaRPr lang="en-US"/>
           </a:p>
         </p:txBody>
       </p:sp>
@@ -25514,7 +25529,7 @@
           <a:lstStyle/>
           <a:p>
             <a:r>
-              <a:rPr lang="en-CA">
+              <a:rPr lang="en-CA" dirty="0">
                 <a:solidFill>
                   <a:srgbClr val="FFFFFF"/>
                 </a:solidFill>
@@ -27927,6 +27942,257 @@
 <file path=ppt/slides/slide8.xml><?xml version="1.0" encoding="utf-8"?>
 <p:sld xmlns:a="http://schemas.openxmlformats.org/drawingml/2006/main" xmlns:r="http://schemas.openxmlformats.org/officeDocument/2006/relationships" xmlns:p="http://schemas.openxmlformats.org/presentationml/2006/main">
   <p:cSld>
+    <p:bg>
+      <p:bgPr>
+        <a:solidFill>
+          <a:schemeClr val="bg1"/>
+        </a:solidFill>
+        <a:effectLst/>
+      </p:bgPr>
+    </p:bg>
+    <p:spTree>
+      <p:nvGrpSpPr>
+        <p:cNvPr id="1" name=""/>
+        <p:cNvGrpSpPr/>
+        <p:nvPr/>
+      </p:nvGrpSpPr>
+      <p:grpSpPr>
+        <a:xfrm>
+          <a:off x="0" y="0"/>
+          <a:ext cx="0" cy="0"/>
+          <a:chOff x="0" y="0"/>
+          <a:chExt cx="0" cy="0"/>
+        </a:xfrm>
+      </p:grpSpPr>
+      <p:pic>
+        <p:nvPicPr>
+          <p:cNvPr id="11" name="Content Placeholder 10" descr="A screenshot of a cell phone&#10;&#10;Description automatically generated">
+            <a:extLst>
+              <a:ext uri="{FF2B5EF4-FFF2-40B4-BE49-F238E27FC236}">
+                <a16:creationId xmlns:a16="http://schemas.microsoft.com/office/drawing/2014/main" id="{0AF4FEA8-5A07-4BD9-A1A7-E0282B3AAA50}"/>
+              </a:ext>
+            </a:extLst>
+          </p:cNvPr>
+          <p:cNvPicPr>
+            <a:picLocks noGrp="1" noChangeAspect="1"/>
+          </p:cNvPicPr>
+          <p:nvPr>
+            <p:ph idx="1"/>
+          </p:nvPr>
+        </p:nvPicPr>
+        <p:blipFill>
+          <a:blip r:embed="rId2">
+            <a:extLst>
+              <a:ext uri="{28A0092B-C50C-407E-A947-70E740481C1C}">
+                <a14:useLocalDpi xmlns:a14="http://schemas.microsoft.com/office/drawing/2010/main" val="0"/>
+              </a:ext>
+            </a:extLst>
+          </a:blip>
+          <a:stretch>
+            <a:fillRect/>
+          </a:stretch>
+        </p:blipFill>
+        <p:spPr>
+          <a:xfrm>
+            <a:off x="510635" y="1123527"/>
+            <a:ext cx="3465112" cy="4604800"/>
+          </a:xfrm>
+          <a:prstGeom prst="rect">
+            <a:avLst/>
+          </a:prstGeom>
+        </p:spPr>
+      </p:pic>
+      <p:cxnSp>
+        <p:nvCxnSpPr>
+          <p:cNvPr id="18" name="Straight Connector 17">
+            <a:extLst>
+              <a:ext uri="{FF2B5EF4-FFF2-40B4-BE49-F238E27FC236}">
+                <a16:creationId xmlns:a16="http://schemas.microsoft.com/office/drawing/2014/main" id="{DCD67800-37AC-4E14-89B0-F79DCB3FB86D}"/>
+              </a:ext>
+              <a:ext uri="{C183D7F6-B498-43B3-948B-1728B52AA6E4}">
+                <adec:decorative xmlns:adec="http://schemas.microsoft.com/office/drawing/2017/decorative" val="1"/>
+              </a:ext>
+            </a:extLst>
+          </p:cNvPr>
+          <p:cNvCxnSpPr>
+            <a:cxnSpLocks noGrp="1" noRot="1" noChangeAspect="1" noMove="1" noResize="1" noEditPoints="1" noAdjustHandles="1" noChangeArrowheads="1" noChangeShapeType="1"/>
+          </p:cNvCxnSpPr>
+          <p:nvPr>
+            <p:extLst>
+              <p:ext uri="{386F3935-93C4-4BCD-93E2-E3B085C9AB24}">
+                <p16:designElem xmlns:p16="http://schemas.microsoft.com/office/powerpoint/2015/main" val="1"/>
+              </p:ext>
+            </p:extLst>
+          </p:nvPr>
+        </p:nvCxnSpPr>
+        <p:spPr>
+          <a:xfrm>
+            <a:off x="4165600" y="1573887"/>
+            <a:ext cx="0" cy="3710227"/>
+          </a:xfrm>
+          <a:prstGeom prst="line">
+            <a:avLst/>
+          </a:prstGeom>
+          <a:ln w="19050">
+            <a:solidFill>
+              <a:srgbClr val="7F7F7F"/>
+            </a:solidFill>
+          </a:ln>
+        </p:spPr>
+        <p:style>
+          <a:lnRef idx="1">
+            <a:schemeClr val="accent1"/>
+          </a:lnRef>
+          <a:fillRef idx="0">
+            <a:schemeClr val="accent1"/>
+          </a:fillRef>
+          <a:effectRef idx="0">
+            <a:schemeClr val="accent1"/>
+          </a:effectRef>
+          <a:fontRef idx="minor">
+            <a:schemeClr val="tx1"/>
+          </a:fontRef>
+        </p:style>
+      </p:cxnSp>
+      <p:pic>
+        <p:nvPicPr>
+          <p:cNvPr id="8" name="Content Placeholder 4">
+            <a:extLst>
+              <a:ext uri="{FF2B5EF4-FFF2-40B4-BE49-F238E27FC236}">
+                <a16:creationId xmlns:a16="http://schemas.microsoft.com/office/drawing/2014/main" id="{8AB246E0-E288-42CE-9CF6-2F9319B9F89D}"/>
+              </a:ext>
+            </a:extLst>
+          </p:cNvPr>
+          <p:cNvPicPr>
+            <a:picLocks noChangeAspect="1"/>
+          </p:cNvPicPr>
+          <p:nvPr/>
+        </p:nvPicPr>
+        <p:blipFill rotWithShape="1">
+          <a:blip r:embed="rId3">
+            <a:extLst>
+              <a:ext uri="{28A0092B-C50C-407E-A947-70E740481C1C}">
+                <a14:useLocalDpi xmlns:a14="http://schemas.microsoft.com/office/drawing/2010/main" val="0"/>
+              </a:ext>
+            </a:extLst>
+          </a:blip>
+          <a:srcRect l="9631" t="2031" r="22552" b="1725"/>
+          <a:stretch/>
+        </p:blipFill>
+        <p:spPr>
+          <a:xfrm>
+            <a:off x="4310676" y="1160606"/>
+            <a:ext cx="3537345" cy="4530642"/>
+          </a:xfrm>
+          <a:prstGeom prst="rect">
+            <a:avLst/>
+          </a:prstGeom>
+        </p:spPr>
+      </p:pic>
+      <p:cxnSp>
+        <p:nvCxnSpPr>
+          <p:cNvPr id="20" name="Straight Connector 19">
+            <a:extLst>
+              <a:ext uri="{FF2B5EF4-FFF2-40B4-BE49-F238E27FC236}">
+                <a16:creationId xmlns:a16="http://schemas.microsoft.com/office/drawing/2014/main" id="{20F1788F-A5AE-4188-8274-F7F2E3833ECD}"/>
+              </a:ext>
+              <a:ext uri="{C183D7F6-B498-43B3-948B-1728B52AA6E4}">
+                <adec:decorative xmlns:adec="http://schemas.microsoft.com/office/drawing/2017/decorative" val="1"/>
+              </a:ext>
+            </a:extLst>
+          </p:cNvPr>
+          <p:cNvCxnSpPr>
+            <a:cxnSpLocks noGrp="1" noRot="1" noChangeAspect="1" noMove="1" noResize="1" noEditPoints="1" noAdjustHandles="1" noChangeArrowheads="1" noChangeShapeType="1"/>
+          </p:cNvCxnSpPr>
+          <p:nvPr>
+            <p:extLst>
+              <p:ext uri="{386F3935-93C4-4BCD-93E2-E3B085C9AB24}">
+                <p16:designElem xmlns:p16="http://schemas.microsoft.com/office/powerpoint/2015/main" val="1"/>
+              </p:ext>
+            </p:extLst>
+          </p:nvPr>
+        </p:nvCxnSpPr>
+        <p:spPr>
+          <a:xfrm>
+            <a:off x="7995920" y="1573887"/>
+            <a:ext cx="0" cy="3710227"/>
+          </a:xfrm>
+          <a:prstGeom prst="line">
+            <a:avLst/>
+          </a:prstGeom>
+          <a:ln w="19050">
+            <a:solidFill>
+              <a:srgbClr val="7F7F7F"/>
+            </a:solidFill>
+          </a:ln>
+        </p:spPr>
+        <p:style>
+          <a:lnRef idx="1">
+            <a:schemeClr val="accent1"/>
+          </a:lnRef>
+          <a:fillRef idx="0">
+            <a:schemeClr val="accent1"/>
+          </a:fillRef>
+          <a:effectRef idx="0">
+            <a:schemeClr val="accent1"/>
+          </a:effectRef>
+          <a:fontRef idx="minor">
+            <a:schemeClr val="tx1"/>
+          </a:fontRef>
+        </p:style>
+      </p:cxnSp>
+      <p:pic>
+        <p:nvPicPr>
+          <p:cNvPr id="13" name="Picture 12" descr="A screenshot of a cell phone&#10;&#10;Description automatically generated">
+            <a:extLst>
+              <a:ext uri="{FF2B5EF4-FFF2-40B4-BE49-F238E27FC236}">
+                <a16:creationId xmlns:a16="http://schemas.microsoft.com/office/drawing/2014/main" id="{408303BC-5E09-4857-ABBA-DF575416314B}"/>
+              </a:ext>
+            </a:extLst>
+          </p:cNvPr>
+          <p:cNvPicPr>
+            <a:picLocks noChangeAspect="1"/>
+          </p:cNvPicPr>
+          <p:nvPr/>
+        </p:nvPicPr>
+        <p:blipFill>
+          <a:blip r:embed="rId4">
+            <a:extLst>
+              <a:ext uri="{28A0092B-C50C-407E-A947-70E740481C1C}">
+                <a14:useLocalDpi xmlns:a14="http://schemas.microsoft.com/office/drawing/2010/main" val="0"/>
+              </a:ext>
+            </a:extLst>
+          </a:blip>
+          <a:stretch>
+            <a:fillRect/>
+          </a:stretch>
+        </p:blipFill>
+        <p:spPr>
+          <a:xfrm>
+            <a:off x="8171072" y="1123528"/>
+            <a:ext cx="3499648" cy="4604800"/>
+          </a:xfrm>
+          <a:prstGeom prst="rect">
+            <a:avLst/>
+          </a:prstGeom>
+        </p:spPr>
+      </p:pic>
+    </p:spTree>
+    <p:extLst>
+      <p:ext uri="{BB962C8B-B14F-4D97-AF65-F5344CB8AC3E}">
+        <p14:creationId xmlns:p14="http://schemas.microsoft.com/office/powerpoint/2010/main" val="1775853371"/>
+      </p:ext>
+    </p:extLst>
+  </p:cSld>
+  <p:clrMapOvr>
+    <a:masterClrMapping/>
+  </p:clrMapOvr>
+</p:sld>
+</file>
+
+<file path=ppt/slides/slide9.xml><?xml version="1.0" encoding="utf-8"?>
+<p:sld xmlns:a="http://schemas.openxmlformats.org/drawingml/2006/main" xmlns:r="http://schemas.openxmlformats.org/officeDocument/2006/relationships" xmlns:p="http://schemas.openxmlformats.org/presentationml/2006/main">
+  <p:cSld>
     <p:spTree>
       <p:nvGrpSpPr>
         <p:cNvPr id="1" name=""/>
@@ -27946,7 +28212,7 @@
           <p:cNvPr id="2" name="Title 1">
             <a:extLst>
               <a:ext uri="{FF2B5EF4-FFF2-40B4-BE49-F238E27FC236}">
-                <a16:creationId xmlns:a16="http://schemas.microsoft.com/office/drawing/2014/main" id="{A8859D06-1081-462A-A4F4-C59D2C394C0F}"/>
+                <a16:creationId xmlns:a16="http://schemas.microsoft.com/office/drawing/2014/main" id="{4268661C-3833-4BE0-86BB-46BF44CACFED}"/>
               </a:ext>
             </a:extLst>
           </p:cNvPr>
@@ -27962,7 +28228,7 @@
           <a:bodyPr/>
           <a:lstStyle/>
           <a:p>
-            <a:endParaRPr lang="en-CA"/>
+            <a:endParaRPr lang="en-CA" dirty="0"/>
           </a:p>
         </p:txBody>
       </p:sp>
@@ -27971,7 +28237,7 @@
           <p:cNvPr id="3" name="Content Placeholder 2">
             <a:extLst>
               <a:ext uri="{FF2B5EF4-FFF2-40B4-BE49-F238E27FC236}">
-                <a16:creationId xmlns:a16="http://schemas.microsoft.com/office/drawing/2014/main" id="{76B9C8DF-BBEC-4C74-B1D1-FC8E9CAC5B6A}"/>
+                <a16:creationId xmlns:a16="http://schemas.microsoft.com/office/drawing/2014/main" id="{CABAE435-E04B-456F-B5B2-2F95EDA4D43D}"/>
               </a:ext>
             </a:extLst>
           </p:cNvPr>
@@ -27987,14 +28253,14 @@
           <a:bodyPr/>
           <a:lstStyle/>
           <a:p>
-            <a:endParaRPr lang="en-CA"/>
+            <a:endParaRPr lang="en-CA" dirty="0"/>
           </a:p>
         </p:txBody>
       </p:sp>
     </p:spTree>
     <p:extLst>
       <p:ext uri="{BB962C8B-B14F-4D97-AF65-F5344CB8AC3E}">
-        <p14:creationId xmlns:p14="http://schemas.microsoft.com/office/powerpoint/2010/main" val="1775853371"/>
+        <p14:creationId xmlns:p14="http://schemas.microsoft.com/office/powerpoint/2010/main" val="1540986458"/>
       </p:ext>
     </p:extLst>
   </p:cSld>
@@ -28595,30 +28861,6 @@
 </file>
 
 <file path=customXml/item1.xml><?xml version="1.0" encoding="utf-8"?>
-<p:properties xmlns:p="http://schemas.microsoft.com/office/2006/metadata/properties" xmlns:xsi="http://www.w3.org/2001/XMLSchema-instance" xmlns:pc="http://schemas.microsoft.com/office/infopath/2007/PartnerControls">
-  <documentManagement>
-    <SharedWithUsers xmlns="47ad3d2d-b408-4dbd-9f92-289069ffb334">
-      <UserInfo>
-        <DisplayName>Rajendran Muthukumar</DisplayName>
-        <AccountId>12</AccountId>
-        <AccountType/>
-      </UserInfo>
-      <UserInfo>
-        <DisplayName>Karthikk Tamil Mani</DisplayName>
-        <AccountId>13</AccountId>
-        <AccountType/>
-      </UserInfo>
-      <UserInfo>
-        <DisplayName>Thanigaiselvan Senthil Shanmugam</DisplayName>
-        <AccountId>14</AccountId>
-        <AccountType/>
-      </UserInfo>
-    </SharedWithUsers>
-  </documentManagement>
-</p:properties>
-</file>
-
-<file path=customXml/item2.xml><?xml version="1.0" encoding="utf-8"?>
 <?mso-contentType ?>
 <FormTemplates xmlns="http://schemas.microsoft.com/sharepoint/v3/contenttype/forms">
   <Display>DocumentLibraryForm</Display>
@@ -28627,7 +28869,7 @@
 </FormTemplates>
 </file>
 
-<file path=customXml/item3.xml><?xml version="1.0" encoding="utf-8"?>
+<file path=customXml/item2.xml><?xml version="1.0" encoding="utf-8"?>
 <ct:contentTypeSchema xmlns:ct="http://schemas.microsoft.com/office/2006/metadata/contentType" xmlns:ma="http://schemas.microsoft.com/office/2006/metadata/properties/metaAttributes" ct:_="" ma:_="" ma:contentTypeName="Document" ma:contentTypeID="0x0101003D92F4E2052FDC4A8887633A766C5BC9" ma:contentTypeVersion="4" ma:contentTypeDescription="Create a new document." ma:contentTypeScope="" ma:versionID="2cbe73ea90f1e5b734863d8355645b67">
   <xsd:schema xmlns:xsd="http://www.w3.org/2001/XMLSchema" xmlns:xs="http://www.w3.org/2001/XMLSchema" xmlns:p="http://schemas.microsoft.com/office/2006/metadata/properties" xmlns:ns2="5384f4a2-a2db-44a3-9c37-4ac7efc190ef" xmlns:ns3="47ad3d2d-b408-4dbd-9f92-289069ffb334" targetNamespace="http://schemas.microsoft.com/office/2006/metadata/properties" ma:root="true" ma:fieldsID="b73a4e979a826fd0477de3795f1cae99" ns2:_="" ns3:_="">
     <xsd:import namespace="5384f4a2-a2db-44a3-9c37-4ac7efc190ef"/>
@@ -28792,24 +29034,31 @@
 </ct:contentTypeSchema>
 </file>
 
-<file path=customXml/itemProps1.xml><?xml version="1.0" encoding="utf-8"?>
-<ds:datastoreItem xmlns:ds="http://schemas.openxmlformats.org/officeDocument/2006/customXml" ds:itemID="{3A741CED-F703-42AF-92A5-79CE689D9CD9}">
-  <ds:schemaRefs>
-    <ds:schemaRef ds:uri="http://purl.org/dc/elements/1.1/"/>
-    <ds:schemaRef ds:uri="http://www.w3.org/XML/1998/namespace"/>
-    <ds:schemaRef ds:uri="47ad3d2d-b408-4dbd-9f92-289069ffb334"/>
-    <ds:schemaRef ds:uri="5384f4a2-a2db-44a3-9c37-4ac7efc190ef"/>
-    <ds:schemaRef ds:uri="http://schemas.microsoft.com/office/2006/metadata/properties"/>
-    <ds:schemaRef ds:uri="http://schemas.openxmlformats.org/package/2006/metadata/core-properties"/>
-    <ds:schemaRef ds:uri="http://schemas.microsoft.com/office/2006/documentManagement/types"/>
-    <ds:schemaRef ds:uri="http://schemas.microsoft.com/office/infopath/2007/PartnerControls"/>
-    <ds:schemaRef ds:uri="http://purl.org/dc/dcmitype/"/>
-    <ds:schemaRef ds:uri="http://purl.org/dc/terms/"/>
-  </ds:schemaRefs>
-</ds:datastoreItem>
+<file path=customXml/item3.xml><?xml version="1.0" encoding="utf-8"?>
+<p:properties xmlns:p="http://schemas.microsoft.com/office/2006/metadata/properties" xmlns:xsi="http://www.w3.org/2001/XMLSchema-instance" xmlns:pc="http://schemas.microsoft.com/office/infopath/2007/PartnerControls">
+  <documentManagement>
+    <SharedWithUsers xmlns="47ad3d2d-b408-4dbd-9f92-289069ffb334">
+      <UserInfo>
+        <DisplayName>Rajendran Muthukumar</DisplayName>
+        <AccountId>12</AccountId>
+        <AccountType/>
+      </UserInfo>
+      <UserInfo>
+        <DisplayName>Karthikk Tamil Mani</DisplayName>
+        <AccountId>13</AccountId>
+        <AccountType/>
+      </UserInfo>
+      <UserInfo>
+        <DisplayName>Thanigaiselvan Senthil Shanmugam</DisplayName>
+        <AccountId>14</AccountId>
+        <AccountType/>
+      </UserInfo>
+    </SharedWithUsers>
+  </documentManagement>
+</p:properties>
 </file>
 
-<file path=customXml/itemProps2.xml><?xml version="1.0" encoding="utf-8"?>
+<file path=customXml/itemProps1.xml><?xml version="1.0" encoding="utf-8"?>
 <ds:datastoreItem xmlns:ds="http://schemas.openxmlformats.org/officeDocument/2006/customXml" ds:itemID="{F4B845FC-D728-45B4-8BE2-B2D806ED3F15}">
   <ds:schemaRefs>
     <ds:schemaRef ds:uri="http://schemas.microsoft.com/sharepoint/v3/contenttype/forms"/>
@@ -28817,7 +29066,7 @@
 </ds:datastoreItem>
 </file>
 
-<file path=customXml/itemProps3.xml><?xml version="1.0" encoding="utf-8"?>
+<file path=customXml/itemProps2.xml><?xml version="1.0" encoding="utf-8"?>
 <ds:datastoreItem xmlns:ds="http://schemas.openxmlformats.org/officeDocument/2006/customXml" ds:itemID="{FDDD2261-951F-4DB3-BE40-1C3812A884AF}">
   <ds:schemaRefs>
     <ds:schemaRef ds:uri="http://schemas.microsoft.com/office/2006/metadata/contentType"/>
@@ -28834,4 +29083,14 @@
     <ds:schemaRef ds:uri="http://schemas.microsoft.com/internal/obd"/>
   </ds:schemaRefs>
 </ds:datastoreItem>
+</file>
+
+<file path=customXml/itemProps3.xml><?xml version="1.0" encoding="utf-8"?>
+<ds:datastoreItem xmlns:ds="http://schemas.openxmlformats.org/officeDocument/2006/customXml" ds:itemID="{3A741CED-F703-42AF-92A5-79CE689D9CD9}">
+  <ds:schemaRefs>
+    <ds:schemaRef ds:uri="http://schemas.microsoft.com/office/2006/metadata/properties"/>
+    <ds:schemaRef ds:uri="http://schemas.microsoft.com/office/infopath/2007/PartnerControls"/>
+    <ds:schemaRef ds:uri="47ad3d2d-b408-4dbd-9f92-289069ffb334"/>
+  </ds:schemaRefs>
+</ds:datastoreItem>
 </file>
</xml_diff>